<commit_message>
+ add user model
</commit_message>
<xml_diff>
--- a/springboot/SpringBoot-5.pptx
+++ b/springboot/SpringBoot-5.pptx
@@ -12,7 +12,6 @@
     <p:sldId id="260" r:id="rId6"/>
     <p:sldId id="261" r:id="rId7"/>
     <p:sldId id="262" r:id="rId8"/>
-    <p:sldId id="263" r:id="rId9"/>
   </p:sldIdLst>
   <p:sldSz cx="12192000" cy="6858000"/>
   <p:notesSz cx="6858000" cy="9144000"/>
@@ -250,7 +249,7 @@
           <a:p>
             <a:fld id="{7CF491F5-5DC2-944D-A360-3BDBF1069C61}" type="datetimeFigureOut">
               <a:rPr lang="en-US" smtClean="0"/>
-              <a:t>6/3/19</a:t>
+              <a:t>6/5/19</a:t>
             </a:fld>
             <a:endParaRPr lang="en-US"/>
           </a:p>
@@ -420,7 +419,7 @@
           <a:p>
             <a:fld id="{7CF491F5-5DC2-944D-A360-3BDBF1069C61}" type="datetimeFigureOut">
               <a:rPr lang="en-US" smtClean="0"/>
-              <a:t>6/3/19</a:t>
+              <a:t>6/5/19</a:t>
             </a:fld>
             <a:endParaRPr lang="en-US"/>
           </a:p>
@@ -600,7 +599,7 @@
           <a:p>
             <a:fld id="{7CF491F5-5DC2-944D-A360-3BDBF1069C61}" type="datetimeFigureOut">
               <a:rPr lang="en-US" smtClean="0"/>
-              <a:t>6/3/19</a:t>
+              <a:t>6/5/19</a:t>
             </a:fld>
             <a:endParaRPr lang="en-US"/>
           </a:p>
@@ -770,7 +769,7 @@
           <a:p>
             <a:fld id="{7CF491F5-5DC2-944D-A360-3BDBF1069C61}" type="datetimeFigureOut">
               <a:rPr lang="en-US" smtClean="0"/>
-              <a:t>6/3/19</a:t>
+              <a:t>6/5/19</a:t>
             </a:fld>
             <a:endParaRPr lang="en-US"/>
           </a:p>
@@ -1016,7 +1015,7 @@
           <a:p>
             <a:fld id="{7CF491F5-5DC2-944D-A360-3BDBF1069C61}" type="datetimeFigureOut">
               <a:rPr lang="en-US" smtClean="0"/>
-              <a:t>6/3/19</a:t>
+              <a:t>6/5/19</a:t>
             </a:fld>
             <a:endParaRPr lang="en-US"/>
           </a:p>
@@ -1248,7 +1247,7 @@
           <a:p>
             <a:fld id="{7CF491F5-5DC2-944D-A360-3BDBF1069C61}" type="datetimeFigureOut">
               <a:rPr lang="en-US" smtClean="0"/>
-              <a:t>6/3/19</a:t>
+              <a:t>6/5/19</a:t>
             </a:fld>
             <a:endParaRPr lang="en-US"/>
           </a:p>
@@ -1615,7 +1614,7 @@
           <a:p>
             <a:fld id="{7CF491F5-5DC2-944D-A360-3BDBF1069C61}" type="datetimeFigureOut">
               <a:rPr lang="en-US" smtClean="0"/>
-              <a:t>6/3/19</a:t>
+              <a:t>6/5/19</a:t>
             </a:fld>
             <a:endParaRPr lang="en-US"/>
           </a:p>
@@ -1733,7 +1732,7 @@
           <a:p>
             <a:fld id="{7CF491F5-5DC2-944D-A360-3BDBF1069C61}" type="datetimeFigureOut">
               <a:rPr lang="en-US" smtClean="0"/>
-              <a:t>6/3/19</a:t>
+              <a:t>6/5/19</a:t>
             </a:fld>
             <a:endParaRPr lang="en-US"/>
           </a:p>
@@ -1828,7 +1827,7 @@
           <a:p>
             <a:fld id="{7CF491F5-5DC2-944D-A360-3BDBF1069C61}" type="datetimeFigureOut">
               <a:rPr lang="en-US" smtClean="0"/>
-              <a:t>6/3/19</a:t>
+              <a:t>6/5/19</a:t>
             </a:fld>
             <a:endParaRPr lang="en-US"/>
           </a:p>
@@ -2105,7 +2104,7 @@
           <a:p>
             <a:fld id="{7CF491F5-5DC2-944D-A360-3BDBF1069C61}" type="datetimeFigureOut">
               <a:rPr lang="en-US" smtClean="0"/>
-              <a:t>6/3/19</a:t>
+              <a:t>6/5/19</a:t>
             </a:fld>
             <a:endParaRPr lang="en-US"/>
           </a:p>
@@ -2358,7 +2357,7 @@
           <a:p>
             <a:fld id="{7CF491F5-5DC2-944D-A360-3BDBF1069C61}" type="datetimeFigureOut">
               <a:rPr lang="en-US" smtClean="0"/>
-              <a:t>6/3/19</a:t>
+              <a:t>6/5/19</a:t>
             </a:fld>
             <a:endParaRPr lang="en-US"/>
           </a:p>
@@ -2571,7 +2570,7 @@
           <a:p>
             <a:fld id="{7CF491F5-5DC2-944D-A360-3BDBF1069C61}" type="datetimeFigureOut">
               <a:rPr lang="en-US" smtClean="0"/>
-              <a:t>6/3/19</a:t>
+              <a:t>6/5/19</a:t>
             </a:fld>
             <a:endParaRPr lang="en-US"/>
           </a:p>
@@ -3135,15 +3134,7 @@
             <a:pPr lvl="1"/>
             <a:r>
               <a:rPr lang="zh-CN" altLang="en-US" dirty="0" smtClean="0"/>
-              <a:t>有商品</a:t>
-            </a:r>
-            <a:r>
-              <a:rPr lang="zh-CN" altLang="en-US" dirty="0" smtClean="0"/>
-              <a:t>详情页，</a:t>
-            </a:r>
-            <a:r>
-              <a:rPr lang="zh-CN" altLang="en-US" dirty="0" smtClean="0"/>
-              <a:t>可以购买商品</a:t>
+              <a:t>有商品详情页，可以购买商品</a:t>
             </a:r>
             <a:endParaRPr lang="en-US" altLang="zh-CN" dirty="0" smtClean="0"/>
           </a:p>
@@ -4676,74 +4667,6 @@
     <p:extLst>
       <p:ext uri="{BB962C8B-B14F-4D97-AF65-F5344CB8AC3E}">
         <p14:creationId xmlns:p14="http://schemas.microsoft.com/office/powerpoint/2010/main" val="810565024"/>
-      </p:ext>
-    </p:extLst>
-  </p:cSld>
-  <p:clrMapOvr>
-    <a:masterClrMapping/>
-  </p:clrMapOvr>
-</p:sld>
-</file>
-
-<file path=ppt/slides/slide8.xml><?xml version="1.0" encoding="utf-8"?>
-<p:sld xmlns:a="http://schemas.openxmlformats.org/drawingml/2006/main" xmlns:r="http://schemas.openxmlformats.org/officeDocument/2006/relationships" xmlns:p="http://schemas.openxmlformats.org/presentationml/2006/main">
-  <p:cSld>
-    <p:spTree>
-      <p:nvGrpSpPr>
-        <p:cNvPr id="1" name=""/>
-        <p:cNvGrpSpPr/>
-        <p:nvPr/>
-      </p:nvGrpSpPr>
-      <p:grpSpPr>
-        <a:xfrm>
-          <a:off x="0" y="0"/>
-          <a:ext cx="0" cy="0"/>
-          <a:chOff x="0" y="0"/>
-          <a:chExt cx="0" cy="0"/>
-        </a:xfrm>
-      </p:grpSpPr>
-      <p:sp>
-        <p:nvSpPr>
-          <p:cNvPr id="2" name="Title 1"/>
-          <p:cNvSpPr>
-            <a:spLocks noGrp="1"/>
-          </p:cNvSpPr>
-          <p:nvPr>
-            <p:ph type="title"/>
-          </p:nvPr>
-        </p:nvSpPr>
-        <p:spPr/>
-        <p:txBody>
-          <a:bodyPr/>
-          <a:lstStyle/>
-          <a:p>
-            <a:endParaRPr lang="en-US"/>
-          </a:p>
-        </p:txBody>
-      </p:sp>
-      <p:sp>
-        <p:nvSpPr>
-          <p:cNvPr id="3" name="Content Placeholder 2"/>
-          <p:cNvSpPr>
-            <a:spLocks noGrp="1"/>
-          </p:cNvSpPr>
-          <p:nvPr>
-            <p:ph idx="1"/>
-          </p:nvPr>
-        </p:nvSpPr>
-        <p:spPr/>
-        <p:txBody>
-          <a:bodyPr/>
-          <a:lstStyle/>
-          <a:p>
-            <a:endParaRPr lang="en-US"/>
-          </a:p>
-        </p:txBody>
-      </p:sp>
-    </p:spTree>
-    <p:extLst>
-      <p:ext uri="{BB962C8B-B14F-4D97-AF65-F5344CB8AC3E}">
-        <p14:creationId xmlns:p14="http://schemas.microsoft.com/office/powerpoint/2010/main" val="1248052106"/>
       </p:ext>
     </p:extLst>
   </p:cSld>

</xml_diff>

<commit_message>
+ add nav and bootstrap
</commit_message>
<xml_diff>
--- a/springboot/SpringBoot-5.pptx
+++ b/springboot/SpringBoot-5.pptx
@@ -249,7 +249,7 @@
           <a:p>
             <a:fld id="{7CF491F5-5DC2-944D-A360-3BDBF1069C61}" type="datetimeFigureOut">
               <a:rPr lang="en-US" smtClean="0"/>
-              <a:t>6/5/19</a:t>
+              <a:t>6/6/19</a:t>
             </a:fld>
             <a:endParaRPr lang="en-US"/>
           </a:p>
@@ -419,7 +419,7 @@
           <a:p>
             <a:fld id="{7CF491F5-5DC2-944D-A360-3BDBF1069C61}" type="datetimeFigureOut">
               <a:rPr lang="en-US" smtClean="0"/>
-              <a:t>6/5/19</a:t>
+              <a:t>6/6/19</a:t>
             </a:fld>
             <a:endParaRPr lang="en-US"/>
           </a:p>
@@ -599,7 +599,7 @@
           <a:p>
             <a:fld id="{7CF491F5-5DC2-944D-A360-3BDBF1069C61}" type="datetimeFigureOut">
               <a:rPr lang="en-US" smtClean="0"/>
-              <a:t>6/5/19</a:t>
+              <a:t>6/6/19</a:t>
             </a:fld>
             <a:endParaRPr lang="en-US"/>
           </a:p>
@@ -769,7 +769,7 @@
           <a:p>
             <a:fld id="{7CF491F5-5DC2-944D-A360-3BDBF1069C61}" type="datetimeFigureOut">
               <a:rPr lang="en-US" smtClean="0"/>
-              <a:t>6/5/19</a:t>
+              <a:t>6/6/19</a:t>
             </a:fld>
             <a:endParaRPr lang="en-US"/>
           </a:p>
@@ -1015,7 +1015,7 @@
           <a:p>
             <a:fld id="{7CF491F5-5DC2-944D-A360-3BDBF1069C61}" type="datetimeFigureOut">
               <a:rPr lang="en-US" smtClean="0"/>
-              <a:t>6/5/19</a:t>
+              <a:t>6/6/19</a:t>
             </a:fld>
             <a:endParaRPr lang="en-US"/>
           </a:p>
@@ -1247,7 +1247,7 @@
           <a:p>
             <a:fld id="{7CF491F5-5DC2-944D-A360-3BDBF1069C61}" type="datetimeFigureOut">
               <a:rPr lang="en-US" smtClean="0"/>
-              <a:t>6/5/19</a:t>
+              <a:t>6/6/19</a:t>
             </a:fld>
             <a:endParaRPr lang="en-US"/>
           </a:p>
@@ -1614,7 +1614,7 @@
           <a:p>
             <a:fld id="{7CF491F5-5DC2-944D-A360-3BDBF1069C61}" type="datetimeFigureOut">
               <a:rPr lang="en-US" smtClean="0"/>
-              <a:t>6/5/19</a:t>
+              <a:t>6/6/19</a:t>
             </a:fld>
             <a:endParaRPr lang="en-US"/>
           </a:p>
@@ -1732,7 +1732,7 @@
           <a:p>
             <a:fld id="{7CF491F5-5DC2-944D-A360-3BDBF1069C61}" type="datetimeFigureOut">
               <a:rPr lang="en-US" smtClean="0"/>
-              <a:t>6/5/19</a:t>
+              <a:t>6/6/19</a:t>
             </a:fld>
             <a:endParaRPr lang="en-US"/>
           </a:p>
@@ -1827,7 +1827,7 @@
           <a:p>
             <a:fld id="{7CF491F5-5DC2-944D-A360-3BDBF1069C61}" type="datetimeFigureOut">
               <a:rPr lang="en-US" smtClean="0"/>
-              <a:t>6/5/19</a:t>
+              <a:t>6/6/19</a:t>
             </a:fld>
             <a:endParaRPr lang="en-US"/>
           </a:p>
@@ -2104,7 +2104,7 @@
           <a:p>
             <a:fld id="{7CF491F5-5DC2-944D-A360-3BDBF1069C61}" type="datetimeFigureOut">
               <a:rPr lang="en-US" smtClean="0"/>
-              <a:t>6/5/19</a:t>
+              <a:t>6/6/19</a:t>
             </a:fld>
             <a:endParaRPr lang="en-US"/>
           </a:p>
@@ -2357,7 +2357,7 @@
           <a:p>
             <a:fld id="{7CF491F5-5DC2-944D-A360-3BDBF1069C61}" type="datetimeFigureOut">
               <a:rPr lang="en-US" smtClean="0"/>
-              <a:t>6/5/19</a:t>
+              <a:t>6/6/19</a:t>
             </a:fld>
             <a:endParaRPr lang="en-US"/>
           </a:p>
@@ -2570,7 +2570,7 @@
           <a:p>
             <a:fld id="{7CF491F5-5DC2-944D-A360-3BDBF1069C61}" type="datetimeFigureOut">
               <a:rPr lang="en-US" smtClean="0"/>
-              <a:t>6/5/19</a:t>
+              <a:t>6/6/19</a:t>
             </a:fld>
             <a:endParaRPr lang="en-US"/>
           </a:p>

</xml_diff>